<commit_message>
edited final presentation, edited notebook
</commit_message>
<xml_diff>
--- a/final-project/FinalPresentation_AOS.pptx
+++ b/final-project/FinalPresentation_AOS.pptx
@@ -6263,19 +6263,7 @@
           <a:p>
             <a:r>
               <a:rPr lang="en-US" dirty="0" smtClean="0"/>
-              <a:t>Hypothesis: </a:t>
-            </a:r>
-            <a:r>
-              <a:rPr lang="en-US" dirty="0" smtClean="0"/>
-              <a:t>negative </a:t>
-            </a:r>
-            <a:r>
-              <a:rPr lang="en-US" dirty="0" smtClean="0"/>
-              <a:t>correlation between political agency and existence of terrorist </a:t>
-            </a:r>
-            <a:r>
-              <a:rPr lang="en-US" dirty="0" smtClean="0"/>
-              <a:t>groups</a:t>
+              <a:t>Hypothesis: negative correlation between political agency and existence of terrorist groups</a:t>
             </a:r>
             <a:endParaRPr lang="en-US" dirty="0"/>
           </a:p>
@@ -6383,11 +6371,7 @@
             </a:r>
             <a:r>
               <a:rPr lang="en-US" strike="sngStrike" dirty="0" smtClean="0"/>
-              <a:t> </a:t>
-            </a:r>
-            <a:r>
-              <a:rPr lang="en-US" strike="sngStrike" dirty="0" smtClean="0"/>
-              <a:t>counterterrorism</a:t>
+              <a:t> counterterrorism</a:t>
             </a:r>
           </a:p>
           <a:p>
@@ -6395,7 +6379,6 @@
               <a:rPr lang="en-US" dirty="0" smtClean="0"/>
               <a:t>&gt; Cautionary tale for data use</a:t>
             </a:r>
-            <a:endParaRPr lang="en-US" dirty="0" smtClean="0"/>
           </a:p>
           <a:p>
             <a:endParaRPr lang="en-US" dirty="0"/>
@@ -6403,11 +6386,7 @@
           <a:p>
             <a:r>
               <a:rPr lang="en-US" strike="sngStrike" dirty="0" smtClean="0"/>
-              <a:t>Rethinking definition of ”terrorism” vs. official list of terrorist </a:t>
-            </a:r>
-            <a:r>
-              <a:rPr lang="en-US" strike="sngStrike" dirty="0" smtClean="0"/>
-              <a:t>groups</a:t>
+              <a:t>Rethinking definition of ”terrorism” vs. official list of terrorist groups</a:t>
             </a:r>
           </a:p>
           <a:p>
@@ -6415,7 +6394,6 @@
               <a:rPr lang="en-US" dirty="0" smtClean="0"/>
               <a:t>&gt; Need to classify list of groups as meeting the definition or not, and classify all other political groups globally as well </a:t>
             </a:r>
-            <a:endParaRPr lang="en-US" dirty="0" smtClean="0"/>
           </a:p>
           <a:p>
             <a:endParaRPr lang="en-US" dirty="0"/>
@@ -6423,11 +6401,7 @@
           <a:p>
             <a:r>
               <a:rPr lang="en-US" dirty="0" smtClean="0"/>
-              <a:t>Predicting risk of political </a:t>
-            </a:r>
-            <a:r>
-              <a:rPr lang="en-US" dirty="0" smtClean="0"/>
-              <a:t>violence</a:t>
+              <a:t>Predicting risk of political violence</a:t>
             </a:r>
             <a:endParaRPr lang="en-US" dirty="0"/>
           </a:p>
@@ -6512,13 +6486,17 @@
         <p:spPr/>
         <p:txBody>
           <a:bodyPr>
-            <a:normAutofit lnSpcReduction="10000"/>
+            <a:normAutofit fontScale="92500" lnSpcReduction="10000"/>
           </a:bodyPr>
           <a:lstStyle/>
           <a:p>
             <a:r>
               <a:rPr lang="en-US" dirty="0" smtClean="0"/>
-              <a:t>Explore colonization as a factor</a:t>
+              <a:t>Explore colonization as a </a:t>
+            </a:r>
+            <a:r>
+              <a:rPr lang="en-US" dirty="0" smtClean="0"/>
+              <a:t>factor</a:t>
             </a:r>
           </a:p>
           <a:p>
@@ -6527,7 +6505,11 @@
           <a:p>
             <a:r>
               <a:rPr lang="en-US" dirty="0" smtClean="0"/>
-              <a:t>Look at time series data – when groups were formed, not just when they were declared terrorist groups</a:t>
+              <a:t>Look at time series data – when groups were formed, not just when they were declared terrorist </a:t>
+            </a:r>
+            <a:r>
+              <a:rPr lang="en-US" dirty="0" smtClean="0"/>
+              <a:t>groups</a:t>
             </a:r>
           </a:p>
           <a:p>
@@ -6536,7 +6518,15 @@
           <a:p>
             <a:r>
               <a:rPr lang="en-US" dirty="0" smtClean="0"/>
-              <a:t> Break down geographical areas from countries to regions</a:t>
+              <a:t>Break </a:t>
+            </a:r>
+            <a:r>
+              <a:rPr lang="en-US" dirty="0" smtClean="0"/>
+              <a:t>down geographical areas from countries to </a:t>
+            </a:r>
+            <a:r>
+              <a:rPr lang="en-US" dirty="0" smtClean="0"/>
+              <a:t>regions</a:t>
             </a:r>
           </a:p>
           <a:p>
@@ -6545,17 +6535,26 @@
           <a:p>
             <a:r>
               <a:rPr lang="en-US" dirty="0" smtClean="0"/>
-              <a:t>Look at which groups were declared terrorist groups by multiple countries</a:t>
-            </a:r>
-          </a:p>
-          <a:p>
-            <a:endParaRPr lang="en-US" dirty="0"/>
-          </a:p>
-          <a:p>
+              <a:t>Look at which groups were declared terrorist groups by multiple </a:t>
+            </a:r>
             <a:r>
               <a:rPr lang="en-US" dirty="0" smtClean="0"/>
-              <a:t>Check list of groups against definition of terrorist group</a:t>
-            </a:r>
+              <a:t>countries, and which groups were declared by their home countries</a:t>
+            </a:r>
+          </a:p>
+          <a:p>
+            <a:endParaRPr lang="en-US" dirty="0"/>
+          </a:p>
+          <a:p>
+            <a:r>
+              <a:rPr lang="en-US" dirty="0" smtClean="0"/>
+              <a:t>Check list of groups against definition of terrorist </a:t>
+            </a:r>
+            <a:r>
+              <a:rPr lang="en-US" dirty="0" smtClean="0"/>
+              <a:t>group</a:t>
+            </a:r>
+            <a:endParaRPr lang="en-US" dirty="0" smtClean="0"/>
           </a:p>
           <a:p>
             <a:endParaRPr lang="en-US" dirty="0"/>

</xml_diff>